<commit_message>
Update Peruse - POC Vulnerability Scanner.pptx
</commit_message>
<xml_diff>
--- a/docs/Peruse - POC Vulnerability Scanner.pptx
+++ b/docs/Peruse - POC Vulnerability Scanner.pptx
@@ -17231,7 +17231,24 @@
                   <a:srgbClr val="398BA2"/>
                 </a:solidFill>
               </a:rPr>
-              <a:t>Project repo is on GitHub but it is in private mode, contact us to be added into the repo :D</a:t>
+              <a:t>Project repo: </a:t>
+            </a:r>
+            <a:r>
+              <a:rPr lang="en" sz="1200" u="sng">
+                <a:solidFill>
+                  <a:schemeClr val="hlink"/>
+                </a:solidFill>
+                <a:hlinkClick r:id="rId5"/>
+              </a:rPr>
+              <a:t>https://github.com/0venoven/Peruse</a:t>
+            </a:r>
+            <a:r>
+              <a:rPr lang="en" sz="1200">
+                <a:solidFill>
+                  <a:srgbClr val="398BA2"/>
+                </a:solidFill>
+              </a:rPr>
+              <a:t> , contact us to be added into the repo :D</a:t>
             </a:r>
             <a:endParaRPr sz="1200">
               <a:solidFill>

</xml_diff>